<commit_message>
updated figures on poster
</commit_message>
<xml_diff>
--- a/Ting_Ramaswamy_cs229Poster.pptx
+++ b/Ting_Ramaswamy_cs229Poster.pptx
@@ -3122,7 +3122,7 @@
           <a:graphicData uri="http://schemas.openxmlformats.org/presentationml/2006/ole">
             <mc:AlternateContent xmlns:mc="http://schemas.openxmlformats.org/markup-compatibility/2006">
               <mc:Choice xmlns:v="urn:schemas-microsoft-com:vml" Requires="v">
-                <p:oleObj spid="_x0000_s1082" name="Document" r:id="rId3" imgW="5486400" imgH="546100" progId="Word.Document.12">
+                <p:oleObj spid="_x0000_s1108" name="Document" r:id="rId3" imgW="5486400" imgH="546100" progId="Word.Document.12">
                   <p:embed/>
                 </p:oleObj>
               </mc:Choice>
@@ -3193,7 +3193,7 @@
             <a:graphicData uri="http://schemas.openxmlformats.org/presentationml/2006/ole">
               <mc:AlternateContent xmlns:mc="http://schemas.openxmlformats.org/markup-compatibility/2006">
                 <mc:Choice xmlns:v="urn:schemas-microsoft-com:vml" Requires="v">
-                  <p:oleObj spid="_x0000_s1083" name="Document" r:id="rId5" imgW="5486400" imgH="533400" progId="Word.Document.12">
+                  <p:oleObj spid="_x0000_s1109" name="Document" r:id="rId5" imgW="5486400" imgH="533400" progId="Word.Document.12">
                     <p:embed/>
                   </p:oleObj>
                 </mc:Choice>
@@ -3250,7 +3250,7 @@
             <a:graphicData uri="http://schemas.openxmlformats.org/presentationml/2006/ole">
               <mc:AlternateContent xmlns:mc="http://schemas.openxmlformats.org/markup-compatibility/2006">
                 <mc:Choice xmlns:v="urn:schemas-microsoft-com:vml" Requires="v">
-                  <p:oleObj spid="_x0000_s1084" name="Document" r:id="rId7" imgW="5486400" imgH="254000" progId="Word.Document.12">
+                  <p:oleObj spid="_x0000_s1110" name="Document" r:id="rId7" imgW="5486400" imgH="254000" progId="Word.Document.12">
                     <p:embed/>
                   </p:oleObj>
                 </mc:Choice>
@@ -3307,7 +3307,7 @@
             <a:graphicData uri="http://schemas.openxmlformats.org/presentationml/2006/ole">
               <mc:AlternateContent xmlns:mc="http://schemas.openxmlformats.org/markup-compatibility/2006">
                 <mc:Choice xmlns:v="urn:schemas-microsoft-com:vml" Requires="v">
-                  <p:oleObj spid="_x0000_s1085" name="Document" r:id="rId9" imgW="5486400" imgH="419100" progId="Word.Document.12">
+                  <p:oleObj spid="_x0000_s1111" name="Document" r:id="rId9" imgW="5486400" imgH="419100" progId="Word.Document.12">
                     <p:embed/>
                   </p:oleObj>
                 </mc:Choice>
@@ -3364,7 +3364,7 @@
             <a:graphicData uri="http://schemas.openxmlformats.org/presentationml/2006/ole">
               <mc:AlternateContent xmlns:mc="http://schemas.openxmlformats.org/markup-compatibility/2006">
                 <mc:Choice xmlns:v="urn:schemas-microsoft-com:vml" Requires="v">
-                  <p:oleObj spid="_x0000_s1086" name="Document" r:id="rId11" imgW="5486400" imgH="241300" progId="Word.Document.12">
+                  <p:oleObj spid="_x0000_s1112" name="Document" r:id="rId11" imgW="5486400" imgH="241300" progId="Word.Document.12">
                     <p:embed/>
                   </p:oleObj>
                 </mc:Choice>
@@ -3733,8 +3733,8 @@
         </p:blipFill>
         <p:spPr>
           <a:xfrm>
-            <a:off x="21057994" y="1293429"/>
-            <a:ext cx="4447021" cy="1387471"/>
+            <a:off x="21010274" y="1302176"/>
+            <a:ext cx="4635849" cy="1446385"/>
           </a:xfrm>
           <a:prstGeom prst="rect">
             <a:avLst/>
@@ -4332,15 +4332,7 @@
             </a:pPr>
             <a:r>
               <a:rPr lang="en-US" sz="2400" dirty="0" smtClean="0"/>
-              <a:t>Linear Regression</a:t>
-            </a:r>
-            <a:r>
-              <a:rPr lang="en-US" sz="2400" dirty="0" smtClean="0"/>
-              <a:t>- </a:t>
-            </a:r>
-            <a:r>
-              <a:rPr lang="en-US" sz="2400" dirty="0" smtClean="0"/>
-              <a:t>fits </a:t>
+              <a:t>Linear Regression- fits </a:t>
             </a:r>
             <a:r>
               <a:rPr lang="en-US" sz="2400" dirty="0"/>
@@ -4539,11 +4531,7 @@
             </a:pPr>
             <a:r>
               <a:rPr lang="en-US" sz="2400" dirty="0" smtClean="0"/>
-              <a:t>Collaborative Filtering</a:t>
-            </a:r>
-            <a:r>
-              <a:rPr lang="en-US" sz="2400" dirty="0" smtClean="0"/>
-              <a:t>- </a:t>
+              <a:t>Collaborative Filtering- </a:t>
             </a:r>
             <a:r>
               <a:rPr lang="en-US" sz="2400" dirty="0"/>
@@ -4595,11 +4583,7 @@
           <a:p>
             <a:r>
               <a:rPr lang="en-US" sz="2400" dirty="0"/>
-              <a:t>The results show that </a:t>
-            </a:r>
-            <a:r>
-              <a:rPr lang="en-US" sz="2400" dirty="0"/>
-              <a:t>e</a:t>
+              <a:t>The results show that e</a:t>
             </a:r>
             <a:r>
               <a:rPr lang="en-US" sz="2400" dirty="0" smtClean="0"/>
@@ -4637,7 +4621,6 @@
               <a:rPr lang="en-US" sz="2400" dirty="0" smtClean="0"/>
               <a:t>are lasso and elastic net. </a:t>
             </a:r>
-            <a:endParaRPr lang="en-US" sz="2400" dirty="0" smtClean="0"/>
           </a:p>
           <a:p>
             <a:endParaRPr lang="en-US" sz="2400" dirty="0"/>
@@ -4655,7 +4638,7 @@
         </p:nvSpPr>
         <p:spPr>
           <a:xfrm>
-            <a:off x="1083043" y="4689435"/>
+            <a:off x="1083043" y="4620779"/>
             <a:ext cx="8077200" cy="3046988"/>
           </a:xfrm>
           <a:prstGeom prst="rect">
@@ -4958,15 +4941,7 @@
             </a:r>
             <a:r>
               <a:rPr lang="en-US" sz="2400" dirty="0" smtClean="0"/>
-              <a:t>usiness </a:t>
-            </a:r>
-            <a:r>
-              <a:rPr lang="en-US" sz="2400" dirty="0" smtClean="0"/>
-              <a:t>open, </a:t>
-            </a:r>
-            <a:r>
-              <a:rPr lang="en-US" sz="2400" dirty="0" smtClean="0"/>
-              <a:t>business </a:t>
+              <a:t>usiness open, business </a:t>
             </a:r>
             <a:r>
               <a:rPr lang="en-US" sz="2400" dirty="0"/>
@@ -4974,11 +4949,7 @@
             </a:r>
             <a:r>
               <a:rPr lang="en-US" sz="2400" dirty="0" smtClean="0"/>
-              <a:t>, </a:t>
-            </a:r>
-            <a:r>
-              <a:rPr lang="en-US" sz="2400" dirty="0" smtClean="0"/>
-              <a:t>business </a:t>
+              <a:t>, business </a:t>
             </a:r>
             <a:r>
               <a:rPr lang="en-US" sz="2400" dirty="0"/>
@@ -4986,11 +4957,7 @@
             </a:r>
             <a:r>
               <a:rPr lang="en-US" sz="2400" dirty="0" smtClean="0"/>
-              <a:t>count, </a:t>
-            </a:r>
-            <a:r>
-              <a:rPr lang="en-US" sz="2400" dirty="0" smtClean="0"/>
-              <a:t>user </a:t>
+              <a:t>count, user </a:t>
             </a:r>
             <a:r>
               <a:rPr lang="en-US" sz="2400" dirty="0"/>
@@ -4998,19 +4965,7 @@
             </a:r>
             <a:r>
               <a:rPr lang="en-US" sz="2400" dirty="0" smtClean="0"/>
-              <a:t>count, </a:t>
-            </a:r>
-            <a:r>
-              <a:rPr lang="en-US" sz="2400" dirty="0" smtClean="0"/>
-              <a:t>user </a:t>
-            </a:r>
-            <a:r>
-              <a:rPr lang="en-US" sz="2400" dirty="0" smtClean="0"/>
-              <a:t>average, </a:t>
-            </a:r>
-            <a:r>
-              <a:rPr lang="en-US" sz="2400" dirty="0" smtClean="0"/>
-              <a:t>number </a:t>
+              <a:t>count, user average, number </a:t>
             </a:r>
             <a:r>
               <a:rPr lang="en-US" sz="2400" dirty="0"/>
@@ -5018,11 +4973,7 @@
             </a:r>
             <a:r>
               <a:rPr lang="en-US" sz="2400" dirty="0" smtClean="0"/>
-              <a:t>votes, </a:t>
-            </a:r>
-            <a:r>
-              <a:rPr lang="en-US" sz="2400" dirty="0" smtClean="0"/>
-              <a:t>number </a:t>
+              <a:t>votes, number </a:t>
             </a:r>
             <a:r>
               <a:rPr lang="en-US" sz="2400" dirty="0"/>
@@ -5030,11 +4981,7 @@
             </a:r>
             <a:r>
               <a:rPr lang="en-US" sz="2400" dirty="0" smtClean="0"/>
-              <a:t>votes, </a:t>
-            </a:r>
-            <a:r>
-              <a:rPr lang="en-US" sz="2400" dirty="0" smtClean="0"/>
-              <a:t>number </a:t>
+              <a:t>votes, number </a:t>
             </a:r>
             <a:r>
               <a:rPr lang="en-US" sz="2400" dirty="0"/>
@@ -5080,7 +5027,7 @@
             </a:r>
             <a:r>
               <a:rPr lang="en-US" sz="2400" dirty="0" smtClean="0"/>
-              <a:t>where nothing is missing, PCA for dimensionality reduction, and segmentation ensemble which fits the model to each part of the missing data. </a:t>
+              <a:t>where nothing is missing, PCA for dimensionality reduction, and segmentation ensemble which fits the model to each part of the missing data.. </a:t>
             </a:r>
             <a:endParaRPr lang="en-US" sz="2400" dirty="0"/>
           </a:p>
@@ -5088,7 +5035,7 @@
       </p:sp>
       <p:pic>
         <p:nvPicPr>
-          <p:cNvPr id="4" name="Picture 3" descr="Screen Shot 2014-12-02 at 10.12.25 AM.pdf"/>
+          <p:cNvPr id="16" name="Picture 15" descr="Screen Shot 2014-12-02 at 9.09.40 PM.pdf"/>
           <p:cNvPicPr>
             <a:picLocks noChangeAspect="1"/>
           </p:cNvPicPr>
@@ -5108,8 +5055,8 @@
         </p:blipFill>
         <p:spPr>
           <a:xfrm>
-            <a:off x="17837001" y="5980421"/>
-            <a:ext cx="7668014" cy="5127111"/>
+            <a:off x="18271702" y="5958420"/>
+            <a:ext cx="8166568" cy="4952970"/>
           </a:xfrm>
           <a:prstGeom prst="rect">
             <a:avLst/>
@@ -5118,7 +5065,7 @@
       </p:pic>
       <p:pic>
         <p:nvPicPr>
-          <p:cNvPr id="5" name="Picture 4" descr="Screen Shot 2014-12-02 at 10.12.34 AM.pdf"/>
+          <p:cNvPr id="22" name="Picture 21" descr="Screen Shot 2014-12-02 at 9.10.45 PM.pdf"/>
           <p:cNvPicPr>
             <a:picLocks noChangeAspect="1"/>
           </p:cNvPicPr>
@@ -5138,38 +5085,8 @@
         </p:blipFill>
         <p:spPr>
           <a:xfrm>
-            <a:off x="25209593" y="6434219"/>
-            <a:ext cx="1416853" cy="687892"/>
-          </a:xfrm>
-          <a:prstGeom prst="rect">
-            <a:avLst/>
-          </a:prstGeom>
-        </p:spPr>
-      </p:pic>
-      <p:pic>
-        <p:nvPicPr>
-          <p:cNvPr id="17" name="Picture 16" descr="Screen Shot 2014-12-02 at 10.15.26 AM.pdf"/>
-          <p:cNvPicPr>
-            <a:picLocks noChangeAspect="1"/>
-          </p:cNvPicPr>
-          <p:nvPr/>
-        </p:nvPicPr>
-        <p:blipFill>
-          <a:blip r:embed="rId18">
-            <a:extLst>
-              <a:ext uri="{28A0092B-C50C-407E-A947-70E740481C1C}">
-                <a14:useLocalDpi xmlns:a14="http://schemas.microsoft.com/office/drawing/2010/main" val="0"/>
-              </a:ext>
-            </a:extLst>
-          </a:blip>
-          <a:stretch>
-            <a:fillRect/>
-          </a:stretch>
-        </p:blipFill>
-        <p:spPr>
-          <a:xfrm>
-            <a:off x="22269897" y="13316910"/>
-            <a:ext cx="4390894" cy="3485319"/>
+            <a:off x="22218436" y="13436265"/>
+            <a:ext cx="4363191" cy="3347664"/>
           </a:xfrm>
           <a:prstGeom prst="rect">
             <a:avLst/>

</xml_diff>